<commit_message>
partial updates based on comments from JN
</commit_message>
<xml_diff>
--- a/docs/ref-info/images/resource/HowUID2Created_UID2ImplementationPlaybook.pptx
+++ b/docs/ref-info/images/resource/HowUID2Created_UID2ImplementationPlaybook.pptx
@@ -231,7 +231,7 @@
             <a:fld id="{91C16C1E-FEE2-294C-9E14-46B851FD2875}" type="datetimeFigureOut">
               <a:rPr lang="en-US" smtClean="0"/>
               <a:pPr/>
-              <a:t>2/19/2025</a:t>
+              <a:t>2/20/2025</a:t>
             </a:fld>
             <a:endParaRPr lang="en-US"/>
           </a:p>
@@ -21457,7 +21457,7 @@
             </a:pPr>
             <a:r>
               <a:rPr lang="en-US" sz="1200" b="1" u="sng" dirty="0"/>
-              <a:t>First Layer: Hash</a:t>
+              <a:t>First Step: Hash</a:t>
             </a:r>
           </a:p>
           <a:p>
@@ -21611,7 +21611,7 @@
             </a:pPr>
             <a:r>
               <a:rPr lang="en-US" sz="1200" b="1" u="sng" dirty="0"/>
-              <a:t>Second Layer: Hash &amp; Salt</a:t>
+              <a:t>Second Step: Hash &amp; Salt</a:t>
             </a:r>
           </a:p>
           <a:p>
@@ -21767,8 +21767,12 @@
               </a:lnSpc>
             </a:pPr>
             <a:r>
+              <a:rPr lang="en-US" sz="1200" b="1" u="sng"/>
+              <a:t>Third Step: </a:t>
+            </a:r>
+            <a:r>
               <a:rPr lang="en-US" sz="1200" b="1" u="sng" dirty="0"/>
-              <a:t>Third Layer: Encryption</a:t>
+              <a:t>Encryption</a:t>
             </a:r>
           </a:p>
           <a:p>
@@ -22047,7 +22051,7 @@
                   <a:schemeClr val="tx1"/>
                 </a:solidFill>
               </a:rPr>
-              <a:t>API Request Encryption</a:t>
+              <a:t>API Request Application-Level Encryption</a:t>
             </a:r>
           </a:p>
         </p:txBody>
@@ -22867,31 +22871,6 @@
 </file>
 
 <file path=customXml/item1.xml><?xml version="1.0" encoding="utf-8"?>
-<?mso-contentType ?>
-<FormTemplates xmlns="http://schemas.microsoft.com/sharepoint/v3/contenttype/forms">
-  <Display>DocumentLibraryForm</Display>
-  <Edit>DocumentLibraryForm</Edit>
-  <New>DocumentLibraryForm</New>
-</FormTemplates>
-</file>
-
-<file path=customXml/item2.xml><?xml version="1.0" encoding="utf-8"?>
-<p:properties xmlns:p="http://schemas.microsoft.com/office/2006/metadata/properties" xmlns:xsi="http://www.w3.org/2001/XMLSchema-instance" xmlns:pc="http://schemas.microsoft.com/office/infopath/2007/PartnerControls">
-  <documentManagement>
-    <MigrationWizIdPermissionLevels xmlns="c9e1d374-2cc8-4ad7-ac57-672bd4719810" xsi:nil="true"/>
-    <MigrationWizIdDocumentLibraryPermissions xmlns="c9e1d374-2cc8-4ad7-ac57-672bd4719810" xsi:nil="true"/>
-    <TaxCatchAll xmlns="d0219bc0-6c02-4013-9ac3-282d3151ce2e" xsi:nil="true"/>
-    <MigrationWizId xmlns="c9e1d374-2cc8-4ad7-ac57-672bd4719810" xsi:nil="true"/>
-    <MigrationWizIdPermissions xmlns="c9e1d374-2cc8-4ad7-ac57-672bd4719810" xsi:nil="true"/>
-    <MigrationWizIdSecurityGroups xmlns="c9e1d374-2cc8-4ad7-ac57-672bd4719810" xsi:nil="true"/>
-    <lcf76f155ced4ddcb4097134ff3c332f xmlns="c9e1d374-2cc8-4ad7-ac57-672bd4719810">
-      <Terms xmlns="http://schemas.microsoft.com/office/infopath/2007/PartnerControls"/>
-    </lcf76f155ced4ddcb4097134ff3c332f>
-  </documentManagement>
-</p:properties>
-</file>
-
-<file path=customXml/item3.xml><?xml version="1.0" encoding="utf-8"?>
 <ct:contentTypeSchema xmlns:ct="http://schemas.microsoft.com/office/2006/metadata/contentType" xmlns:ma="http://schemas.microsoft.com/office/2006/metadata/properties/metaAttributes" ct:_="" ma:_="" ma:contentTypeName="Document" ma:contentTypeID="0x010100E48B5D2F83D76C448A07B39BA1D0BE11" ma:contentTypeVersion="23" ma:contentTypeDescription="Create a new document." ma:contentTypeScope="" ma:versionID="5feb17c939512f52cd8f793c3130c307">
   <xsd:schema xmlns:xsd="http://www.w3.org/2001/XMLSchema" xmlns:xs="http://www.w3.org/2001/XMLSchema" xmlns:p="http://schemas.microsoft.com/office/2006/metadata/properties" xmlns:ns2="c9e1d374-2cc8-4ad7-ac57-672bd4719810" xmlns:ns3="d0219bc0-6c02-4013-9ac3-282d3151ce2e" targetNamespace="http://schemas.microsoft.com/office/2006/metadata/properties" ma:root="true" ma:fieldsID="dde59188cf093581f9e795560093f135" ns2:_="" ns3:_="">
     <xsd:import namespace="c9e1d374-2cc8-4ad7-ac57-672bd4719810"/>
@@ -23176,10 +23155,46 @@
 </ct:contentTypeSchema>
 </file>
 
+<file path=customXml/item2.xml><?xml version="1.0" encoding="utf-8"?>
+<p:properties xmlns:p="http://schemas.microsoft.com/office/2006/metadata/properties" xmlns:xsi="http://www.w3.org/2001/XMLSchema-instance" xmlns:pc="http://schemas.microsoft.com/office/infopath/2007/PartnerControls">
+  <documentManagement>
+    <MigrationWizIdPermissionLevels xmlns="c9e1d374-2cc8-4ad7-ac57-672bd4719810" xsi:nil="true"/>
+    <MigrationWizIdDocumentLibraryPermissions xmlns="c9e1d374-2cc8-4ad7-ac57-672bd4719810" xsi:nil="true"/>
+    <TaxCatchAll xmlns="d0219bc0-6c02-4013-9ac3-282d3151ce2e" xsi:nil="true"/>
+    <MigrationWizId xmlns="c9e1d374-2cc8-4ad7-ac57-672bd4719810" xsi:nil="true"/>
+    <MigrationWizIdPermissions xmlns="c9e1d374-2cc8-4ad7-ac57-672bd4719810" xsi:nil="true"/>
+    <MigrationWizIdSecurityGroups xmlns="c9e1d374-2cc8-4ad7-ac57-672bd4719810" xsi:nil="true"/>
+    <lcf76f155ced4ddcb4097134ff3c332f xmlns="c9e1d374-2cc8-4ad7-ac57-672bd4719810">
+      <Terms xmlns="http://schemas.microsoft.com/office/infopath/2007/PartnerControls"/>
+    </lcf76f155ced4ddcb4097134ff3c332f>
+  </documentManagement>
+</p:properties>
+</file>
+
+<file path=customXml/item3.xml><?xml version="1.0" encoding="utf-8"?>
+<?mso-contentType ?>
+<FormTemplates xmlns="http://schemas.microsoft.com/sharepoint/v3/contenttype/forms">
+  <Display>DocumentLibraryForm</Display>
+  <Edit>DocumentLibraryForm</Edit>
+  <New>DocumentLibraryForm</New>
+</FormTemplates>
+</file>
+
 <file path=customXml/itemProps1.xml><?xml version="1.0" encoding="utf-8"?>
-<ds:datastoreItem xmlns:ds="http://schemas.openxmlformats.org/officeDocument/2006/customXml" ds:itemID="{12914FD8-4AD6-4C8A-BEBA-218A9873FF18}">
+<ds:datastoreItem xmlns:ds="http://schemas.openxmlformats.org/officeDocument/2006/customXml" ds:itemID="{85D5A607-F60E-4151-B474-1B502784665C}">
   <ds:schemaRefs>
-    <ds:schemaRef ds:uri="http://schemas.microsoft.com/sharepoint/v3/contenttype/forms"/>
+    <ds:schemaRef ds:uri="http://schemas.microsoft.com/office/2006/metadata/contentType"/>
+    <ds:schemaRef ds:uri="http://schemas.microsoft.com/office/2006/metadata/properties/metaAttributes"/>
+    <ds:schemaRef ds:uri="http://www.w3.org/2001/XMLSchema"/>
+    <ds:schemaRef ds:uri="http://schemas.microsoft.com/office/2006/metadata/properties"/>
+    <ds:schemaRef ds:uri="c9e1d374-2cc8-4ad7-ac57-672bd4719810"/>
+    <ds:schemaRef ds:uri="d0219bc0-6c02-4013-9ac3-282d3151ce2e"/>
+    <ds:schemaRef ds:uri="http://schemas.microsoft.com/office/2006/documentManagement/types"/>
+    <ds:schemaRef ds:uri="http://schemas.microsoft.com/office/infopath/2007/PartnerControls"/>
+    <ds:schemaRef ds:uri="http://schemas.openxmlformats.org/package/2006/metadata/core-properties"/>
+    <ds:schemaRef ds:uri="http://purl.org/dc/elements/1.1/"/>
+    <ds:schemaRef ds:uri="http://purl.org/dc/terms/"/>
+    <ds:schemaRef ds:uri="http://schemas.microsoft.com/internal/obd"/>
   </ds:schemaRefs>
 </ds:datastoreItem>
 </file>
@@ -23202,20 +23217,9 @@
 </file>
 
 <file path=customXml/itemProps3.xml><?xml version="1.0" encoding="utf-8"?>
-<ds:datastoreItem xmlns:ds="http://schemas.openxmlformats.org/officeDocument/2006/customXml" ds:itemID="{85D5A607-F60E-4151-B474-1B502784665C}">
+<ds:datastoreItem xmlns:ds="http://schemas.openxmlformats.org/officeDocument/2006/customXml" ds:itemID="{12914FD8-4AD6-4C8A-BEBA-218A9873FF18}">
   <ds:schemaRefs>
-    <ds:schemaRef ds:uri="http://schemas.microsoft.com/office/2006/metadata/contentType"/>
-    <ds:schemaRef ds:uri="http://schemas.microsoft.com/office/2006/metadata/properties/metaAttributes"/>
-    <ds:schemaRef ds:uri="http://www.w3.org/2001/XMLSchema"/>
-    <ds:schemaRef ds:uri="http://schemas.microsoft.com/office/2006/metadata/properties"/>
-    <ds:schemaRef ds:uri="c9e1d374-2cc8-4ad7-ac57-672bd4719810"/>
-    <ds:schemaRef ds:uri="d0219bc0-6c02-4013-9ac3-282d3151ce2e"/>
-    <ds:schemaRef ds:uri="http://schemas.microsoft.com/office/2006/documentManagement/types"/>
-    <ds:schemaRef ds:uri="http://schemas.microsoft.com/office/infopath/2007/PartnerControls"/>
-    <ds:schemaRef ds:uri="http://schemas.openxmlformats.org/package/2006/metadata/core-properties"/>
-    <ds:schemaRef ds:uri="http://purl.org/dc/elements/1.1/"/>
-    <ds:schemaRef ds:uri="http://purl.org/dc/terms/"/>
-    <ds:schemaRef ds:uri="http://schemas.microsoft.com/internal/obd"/>
+    <ds:schemaRef ds:uri="http://schemas.microsoft.com/sharepoint/v3/contenttype/forms"/>
   </ds:schemaRefs>
 </ds:datastoreItem>
 </file>
</xml_diff>

<commit_message>
diagram update to bold the salt value
</commit_message>
<xml_diff>
--- a/docs/ref-info/images/resource/HowUID2Created_UID2ImplementationPlaybook.pptx
+++ b/docs/ref-info/images/resource/HowUID2Created_UID2ImplementationPlaybook.pptx
@@ -231,7 +231,7 @@
             <a:fld id="{91C16C1E-FEE2-294C-9E14-46B851FD2875}" type="datetimeFigureOut">
               <a:rPr lang="en-US" smtClean="0"/>
               <a:pPr/>
-              <a:t>2/21/2025</a:t>
+              <a:t>2/24/2025</a:t>
             </a:fld>
             <a:endParaRPr lang="en-US"/>
           </a:p>
@@ -21666,7 +21666,7 @@
           <a:p>
             <a:pPr algn="ctr"/>
             <a:r>
-              <a:rPr lang="en-SG" sz="1400" b="0" i="0" dirty="0">
+              <a:rPr lang="en-SG" sz="1200" b="0" i="0" dirty="0">
                 <a:solidFill>
                   <a:schemeClr val="bg1"/>
                 </a:solidFill>
@@ -21704,11 +21704,15 @@
               </a:rPr>
             </a:br>
             <a:r>
-              <a:rPr lang="en-US" sz="1400" dirty="0"/>
-              <a:t>tMmiiTI7IaAcPpQPFQ65uMVCWH8av9jw4cwf/F5HVRQ=y5YitNf/KFtceipDz8nqsFVmBZsK3KY7s8bOVM4gMD4=</a:t>
+              <a:rPr lang="en-US" sz="1200" dirty="0"/>
+              <a:t>tMmiiTI7IaAcPpQPFQ65uMVCWH8av9jw4cwf/F5HVRQ=</a:t>
+            </a:r>
+            <a:r>
+              <a:rPr lang="en-US" sz="1200" b="1" dirty="0"/>
+              <a:t>y5YitNf/KFtceipDz8nqsFVmBZsK3KY7s8bOVM4gMD4=</a:t>
             </a:r>
             <a:br>
-              <a:rPr lang="en-US" sz="1400" dirty="0"/>
+              <a:rPr lang="en-US" sz="1400" b="1" dirty="0"/>
             </a:br>
             <a:r>
               <a:rPr lang="en-SG" sz="1000" b="0" i="0" dirty="0">
@@ -21730,7 +21734,11 @@
             </a:r>
             <a:r>
               <a:rPr lang="en-US" sz="1400" dirty="0"/>
-              <a:t> FTXiHhlkcWtxa49TDrZOL5mrXcHbUmvYyw9lcCv7+kI=</a:t>
+              <a:t> </a:t>
+            </a:r>
+            <a:r>
+              <a:rPr lang="en-US" sz="1200" dirty="0"/>
+              <a:t>FTXiHhlkcWtxa49TDrZOL5mrXcHbUmvYyw9lcCv7+kI=</a:t>
             </a:r>
           </a:p>
           <a:p>
@@ -21881,13 +21889,22 @@
           <a:p>
             <a:pPr algn="ctr"/>
             <a:r>
-              <a:rPr lang="en-SG" sz="1200" b="0" i="0" dirty="0">
+              <a:rPr lang="en-SG" sz="1400" b="0" i="0" dirty="0">
                 <a:solidFill>
                   <a:schemeClr val="bg1"/>
                 </a:solidFill>
                 <a:effectLst/>
               </a:rPr>
-              <a:t>↓ </a:t>
+              <a:t>↓</a:t>
+            </a:r>
+            <a:r>
+              <a:rPr lang="en-SG" sz="1200" b="0" i="0" dirty="0">
+                <a:solidFill>
+                  <a:schemeClr val="bg1"/>
+                </a:solidFill>
+                <a:effectLst/>
+              </a:rPr>
+              <a:t> </a:t>
             </a:r>
             <a:endParaRPr lang="en-US" dirty="0"/>
           </a:p>
@@ -23064,31 +23081,6 @@
 </file>
 
 <file path=customXml/item1.xml><?xml version="1.0" encoding="utf-8"?>
-<?mso-contentType ?>
-<FormTemplates xmlns="http://schemas.microsoft.com/sharepoint/v3/contenttype/forms">
-  <Display>DocumentLibraryForm</Display>
-  <Edit>DocumentLibraryForm</Edit>
-  <New>DocumentLibraryForm</New>
-</FormTemplates>
-</file>
-
-<file path=customXml/item2.xml><?xml version="1.0" encoding="utf-8"?>
-<p:properties xmlns:p="http://schemas.microsoft.com/office/2006/metadata/properties" xmlns:xsi="http://www.w3.org/2001/XMLSchema-instance" xmlns:pc="http://schemas.microsoft.com/office/infopath/2007/PartnerControls">
-  <documentManagement>
-    <MigrationWizIdPermissionLevels xmlns="c9e1d374-2cc8-4ad7-ac57-672bd4719810" xsi:nil="true"/>
-    <MigrationWizIdDocumentLibraryPermissions xmlns="c9e1d374-2cc8-4ad7-ac57-672bd4719810" xsi:nil="true"/>
-    <TaxCatchAll xmlns="d0219bc0-6c02-4013-9ac3-282d3151ce2e" xsi:nil="true"/>
-    <MigrationWizId xmlns="c9e1d374-2cc8-4ad7-ac57-672bd4719810" xsi:nil="true"/>
-    <MigrationWizIdPermissions xmlns="c9e1d374-2cc8-4ad7-ac57-672bd4719810" xsi:nil="true"/>
-    <MigrationWizIdSecurityGroups xmlns="c9e1d374-2cc8-4ad7-ac57-672bd4719810" xsi:nil="true"/>
-    <lcf76f155ced4ddcb4097134ff3c332f xmlns="c9e1d374-2cc8-4ad7-ac57-672bd4719810">
-      <Terms xmlns="http://schemas.microsoft.com/office/infopath/2007/PartnerControls"/>
-    </lcf76f155ced4ddcb4097134ff3c332f>
-  </documentManagement>
-</p:properties>
-</file>
-
-<file path=customXml/item3.xml><?xml version="1.0" encoding="utf-8"?>
 <ct:contentTypeSchema xmlns:ct="http://schemas.microsoft.com/office/2006/metadata/contentType" xmlns:ma="http://schemas.microsoft.com/office/2006/metadata/properties/metaAttributes" ct:_="" ma:_="" ma:contentTypeName="Document" ma:contentTypeID="0x010100E48B5D2F83D76C448A07B39BA1D0BE11" ma:contentTypeVersion="23" ma:contentTypeDescription="Create a new document." ma:contentTypeScope="" ma:versionID="5feb17c939512f52cd8f793c3130c307">
   <xsd:schema xmlns:xsd="http://www.w3.org/2001/XMLSchema" xmlns:xs="http://www.w3.org/2001/XMLSchema" xmlns:p="http://schemas.microsoft.com/office/2006/metadata/properties" xmlns:ns2="c9e1d374-2cc8-4ad7-ac57-672bd4719810" xmlns:ns3="d0219bc0-6c02-4013-9ac3-282d3151ce2e" targetNamespace="http://schemas.microsoft.com/office/2006/metadata/properties" ma:root="true" ma:fieldsID="dde59188cf093581f9e795560093f135" ns2:_="" ns3:_="">
     <xsd:import namespace="c9e1d374-2cc8-4ad7-ac57-672bd4719810"/>
@@ -23373,10 +23365,46 @@
 </ct:contentTypeSchema>
 </file>
 
+<file path=customXml/item2.xml><?xml version="1.0" encoding="utf-8"?>
+<p:properties xmlns:p="http://schemas.microsoft.com/office/2006/metadata/properties" xmlns:xsi="http://www.w3.org/2001/XMLSchema-instance" xmlns:pc="http://schemas.microsoft.com/office/infopath/2007/PartnerControls">
+  <documentManagement>
+    <MigrationWizIdPermissionLevels xmlns="c9e1d374-2cc8-4ad7-ac57-672bd4719810" xsi:nil="true"/>
+    <MigrationWizIdDocumentLibraryPermissions xmlns="c9e1d374-2cc8-4ad7-ac57-672bd4719810" xsi:nil="true"/>
+    <TaxCatchAll xmlns="d0219bc0-6c02-4013-9ac3-282d3151ce2e" xsi:nil="true"/>
+    <MigrationWizId xmlns="c9e1d374-2cc8-4ad7-ac57-672bd4719810" xsi:nil="true"/>
+    <MigrationWizIdPermissions xmlns="c9e1d374-2cc8-4ad7-ac57-672bd4719810" xsi:nil="true"/>
+    <MigrationWizIdSecurityGroups xmlns="c9e1d374-2cc8-4ad7-ac57-672bd4719810" xsi:nil="true"/>
+    <lcf76f155ced4ddcb4097134ff3c332f xmlns="c9e1d374-2cc8-4ad7-ac57-672bd4719810">
+      <Terms xmlns="http://schemas.microsoft.com/office/infopath/2007/PartnerControls"/>
+    </lcf76f155ced4ddcb4097134ff3c332f>
+  </documentManagement>
+</p:properties>
+</file>
+
+<file path=customXml/item3.xml><?xml version="1.0" encoding="utf-8"?>
+<?mso-contentType ?>
+<FormTemplates xmlns="http://schemas.microsoft.com/sharepoint/v3/contenttype/forms">
+  <Display>DocumentLibraryForm</Display>
+  <Edit>DocumentLibraryForm</Edit>
+  <New>DocumentLibraryForm</New>
+</FormTemplates>
+</file>
+
 <file path=customXml/itemProps1.xml><?xml version="1.0" encoding="utf-8"?>
-<ds:datastoreItem xmlns:ds="http://schemas.openxmlformats.org/officeDocument/2006/customXml" ds:itemID="{12914FD8-4AD6-4C8A-BEBA-218A9873FF18}">
+<ds:datastoreItem xmlns:ds="http://schemas.openxmlformats.org/officeDocument/2006/customXml" ds:itemID="{85D5A607-F60E-4151-B474-1B502784665C}">
   <ds:schemaRefs>
-    <ds:schemaRef ds:uri="http://schemas.microsoft.com/sharepoint/v3/contenttype/forms"/>
+    <ds:schemaRef ds:uri="http://schemas.microsoft.com/office/2006/metadata/contentType"/>
+    <ds:schemaRef ds:uri="http://schemas.microsoft.com/office/2006/metadata/properties/metaAttributes"/>
+    <ds:schemaRef ds:uri="http://www.w3.org/2001/XMLSchema"/>
+    <ds:schemaRef ds:uri="http://schemas.microsoft.com/office/2006/metadata/properties"/>
+    <ds:schemaRef ds:uri="c9e1d374-2cc8-4ad7-ac57-672bd4719810"/>
+    <ds:schemaRef ds:uri="d0219bc0-6c02-4013-9ac3-282d3151ce2e"/>
+    <ds:schemaRef ds:uri="http://schemas.microsoft.com/office/2006/documentManagement/types"/>
+    <ds:schemaRef ds:uri="http://schemas.microsoft.com/office/infopath/2007/PartnerControls"/>
+    <ds:schemaRef ds:uri="http://schemas.openxmlformats.org/package/2006/metadata/core-properties"/>
+    <ds:schemaRef ds:uri="http://purl.org/dc/elements/1.1/"/>
+    <ds:schemaRef ds:uri="http://purl.org/dc/terms/"/>
+    <ds:schemaRef ds:uri="http://schemas.microsoft.com/internal/obd"/>
   </ds:schemaRefs>
 </ds:datastoreItem>
 </file>
@@ -23399,20 +23427,9 @@
 </file>
 
 <file path=customXml/itemProps3.xml><?xml version="1.0" encoding="utf-8"?>
-<ds:datastoreItem xmlns:ds="http://schemas.openxmlformats.org/officeDocument/2006/customXml" ds:itemID="{85D5A607-F60E-4151-B474-1B502784665C}">
+<ds:datastoreItem xmlns:ds="http://schemas.openxmlformats.org/officeDocument/2006/customXml" ds:itemID="{12914FD8-4AD6-4C8A-BEBA-218A9873FF18}">
   <ds:schemaRefs>
-    <ds:schemaRef ds:uri="http://schemas.microsoft.com/office/2006/metadata/contentType"/>
-    <ds:schemaRef ds:uri="http://schemas.microsoft.com/office/2006/metadata/properties/metaAttributes"/>
-    <ds:schemaRef ds:uri="http://www.w3.org/2001/XMLSchema"/>
-    <ds:schemaRef ds:uri="http://schemas.microsoft.com/office/2006/metadata/properties"/>
-    <ds:schemaRef ds:uri="c9e1d374-2cc8-4ad7-ac57-672bd4719810"/>
-    <ds:schemaRef ds:uri="d0219bc0-6c02-4013-9ac3-282d3151ce2e"/>
-    <ds:schemaRef ds:uri="http://schemas.microsoft.com/office/2006/documentManagement/types"/>
-    <ds:schemaRef ds:uri="http://schemas.microsoft.com/office/infopath/2007/PartnerControls"/>
-    <ds:schemaRef ds:uri="http://schemas.openxmlformats.org/package/2006/metadata/core-properties"/>
-    <ds:schemaRef ds:uri="http://purl.org/dc/elements/1.1/"/>
-    <ds:schemaRef ds:uri="http://purl.org/dc/terms/"/>
-    <ds:schemaRef ds:uri="http://schemas.microsoft.com/internal/obd"/>
+    <ds:schemaRef ds:uri="http://schemas.microsoft.com/sharepoint/v3/contenttype/forms"/>
   </ds:schemaRefs>
 </ds:datastoreItem>
 </file>
</xml_diff>